<commit_message>
added link to PPTX
</commit_message>
<xml_diff>
--- a/SmartStore.pptx
+++ b/SmartStore.pptx
@@ -50706,6 +50706,22 @@
           </a:p>
           <a:p>
             <a:r>
+              <a:rPr lang="en-US" smtClean="0"/>
+              <a:t>This Presentation: </a:t>
+            </a:r>
+            <a:r>
+              <a:rPr lang="en-US" smtClean="0">
+                <a:hlinkClick r:id="rId4"/>
+              </a:rPr>
+              <a:t>http://bit.ly/I1epls</a:t>
+            </a:r>
+            <a:endParaRPr lang="en-US" smtClean="0"/>
+          </a:p>
+          <a:p>
+            <a:endParaRPr lang="en-US" dirty="0" smtClean="0"/>
+          </a:p>
+          <a:p>
+            <a:r>
               <a:rPr lang="en-US" dirty="0" err="1" smtClean="0"/>
               <a:t>MobileSDK</a:t>
             </a:r>
@@ -50715,7 +50731,7 @@
             </a:r>
             <a:r>
               <a:rPr lang="en-US" dirty="0" smtClean="0">
-                <a:hlinkClick r:id="rId4"/>
+                <a:hlinkClick r:id="rId5"/>
               </a:rPr>
               <a:t>http://wiki.developerforce.com/page/Mobile_SDK</a:t>
             </a:r>
@@ -50731,7 +50747,7 @@
             </a:r>
             <a:r>
               <a:rPr lang="en-US" dirty="0" smtClean="0">
-                <a:hlinkClick r:id="rId5"/>
+                <a:hlinkClick r:id="rId6"/>
               </a:rPr>
               <a:t>https://github.com/tomgersic/SmartStoreDemo</a:t>
             </a:r>

</xml_diff>

<commit_message>
adding some links to other resources to the PPT
</commit_message>
<xml_diff>
--- a/SmartStore.pptx
+++ b/SmartStore.pptx
@@ -50706,16 +50706,16 @@
           </a:p>
           <a:p>
             <a:r>
-              <a:rPr lang="en-US" smtClean="0"/>
+              <a:rPr lang="en-US" dirty="0" smtClean="0"/>
               <a:t>This Presentation: </a:t>
             </a:r>
             <a:r>
-              <a:rPr lang="en-US" smtClean="0">
+              <a:rPr lang="en-US" dirty="0" smtClean="0">
                 <a:hlinkClick r:id="rId4"/>
               </a:rPr>
               <a:t>http://bit.ly/I1epls</a:t>
             </a:r>
-            <a:endParaRPr lang="en-US" smtClean="0"/>
+            <a:endParaRPr lang="en-US" dirty="0" smtClean="0"/>
           </a:p>
           <a:p>
             <a:endParaRPr lang="en-US" dirty="0" smtClean="0"/>
@@ -50751,6 +50751,48 @@
               </a:rPr>
               <a:t>https://github.com/tomgersic/SmartStoreDemo</a:t>
             </a:r>
+            <a:endParaRPr lang="en-US" dirty="0" smtClean="0"/>
+          </a:p>
+          <a:p>
+            <a:endParaRPr lang="en-US" dirty="0" smtClean="0"/>
+          </a:p>
+          <a:p>
+            <a:r>
+              <a:rPr lang="en-US" dirty="0" err="1" smtClean="0"/>
+              <a:t>Sandeep’s</a:t>
+            </a:r>
+            <a:r>
+              <a:rPr lang="en-US" dirty="0" smtClean="0"/>
+              <a:t> blog post: </a:t>
+            </a:r>
+            <a:r>
+              <a:rPr lang="en-US" dirty="0" smtClean="0">
+                <a:hlinkClick r:id="rId7"/>
+              </a:rPr>
+              <a:t>http://bit.ly/xb8H6l</a:t>
+            </a:r>
+            <a:endParaRPr lang="en-US" dirty="0" smtClean="0"/>
+          </a:p>
+          <a:p>
+            <a:endParaRPr lang="en-US" dirty="0" smtClean="0"/>
+          </a:p>
+          <a:p>
+            <a:r>
+              <a:rPr lang="en-US" dirty="0" smtClean="0"/>
+              <a:t>Mobile SDK Workbook: </a:t>
+            </a:r>
+            <a:r>
+              <a:rPr lang="en-US" dirty="0" smtClean="0">
+                <a:hlinkClick r:id="rId7"/>
+              </a:rPr>
+              <a:t>http://bit.ly/xb8H6l</a:t>
+            </a:r>
+            <a:endParaRPr lang="en-US" dirty="0" smtClean="0"/>
+          </a:p>
+          <a:p>
+            <a:pPr>
+              <a:buNone/>
+            </a:pPr>
             <a:endParaRPr lang="en-US" dirty="0" smtClean="0"/>
           </a:p>
           <a:p>
@@ -52958,28 +53000,6 @@
               <a:t> Storage?</a:t>
             </a:r>
             <a:endParaRPr lang="en-US" sz="2800" b="1" dirty="0"/>
-          </a:p>
-        </p:txBody>
-      </p:sp>
-      <p:sp>
-        <p:nvSpPr>
-          <p:cNvPr id="7" name="Content Placeholder 6"/>
-          <p:cNvSpPr>
-            <a:spLocks noGrp="1"/>
-          </p:cNvSpPr>
-          <p:nvPr>
-            <p:ph idx="1"/>
-          </p:nvPr>
-        </p:nvSpPr>
-        <p:spPr/>
-        <p:txBody>
-          <a:bodyPr/>
-          <a:lstStyle/>
-          <a:p>
-            <a:pPr>
-              <a:buNone/>
-            </a:pPr>
-            <a:endParaRPr lang="en-US" dirty="0" smtClean="0"/>
           </a:p>
         </p:txBody>
       </p:sp>

</xml_diff>

<commit_message>
updating SmartStoreDemo to use SFDC Mobile SDK 1.2
</commit_message>
<xml_diff>
--- a/SmartStore.pptx
+++ b/SmartStore.pptx
@@ -36819,7 +36819,7 @@
         <p:nvSpPr>
           <p:cNvPr id="11265" name="Rectangle 1"/>
           <p:cNvSpPr>
-            <a:spLocks noChangeArrowheads="1"/>
+            <a:spLocks noGrp="1" noChangeArrowheads="1"/>
           </p:cNvSpPr>
           <p:nvPr>
             <p:ph type="title"/>
@@ -36864,7 +36864,7 @@
         <p:nvSpPr>
           <p:cNvPr id="11266" name="Rectangle 2"/>
           <p:cNvSpPr>
-            <a:spLocks noChangeArrowheads="1"/>
+            <a:spLocks noGrp="1" noChangeArrowheads="1"/>
           </p:cNvSpPr>
           <p:nvPr>
             <p:ph type="body" idx="1"/>
@@ -37424,7 +37424,7 @@
         <p:nvSpPr>
           <p:cNvPr id="12289" name="Rectangle 1"/>
           <p:cNvSpPr>
-            <a:spLocks noChangeArrowheads="1"/>
+            <a:spLocks noGrp="1" noChangeArrowheads="1"/>
           </p:cNvSpPr>
           <p:nvPr>
             <p:ph type="title"/>
@@ -37469,7 +37469,7 @@
         <p:nvSpPr>
           <p:cNvPr id="12290" name="Rectangle 2"/>
           <p:cNvSpPr>
-            <a:spLocks noChangeArrowheads="1"/>
+            <a:spLocks noGrp="1" noChangeArrowheads="1"/>
           </p:cNvSpPr>
           <p:nvPr>
             <p:ph type="body" idx="1"/>
@@ -38029,7 +38029,7 @@
         <p:nvSpPr>
           <p:cNvPr id="13313" name="Rectangle 1"/>
           <p:cNvSpPr>
-            <a:spLocks noChangeArrowheads="1"/>
+            <a:spLocks noGrp="1" noChangeArrowheads="1"/>
           </p:cNvSpPr>
           <p:nvPr>
             <p:ph type="title"/>
@@ -38074,7 +38074,7 @@
         <p:nvSpPr>
           <p:cNvPr id="13314" name="Rectangle 2"/>
           <p:cNvSpPr>
-            <a:spLocks noChangeArrowheads="1"/>
+            <a:spLocks noGrp="1" noChangeArrowheads="1"/>
           </p:cNvSpPr>
           <p:nvPr>
             <p:ph type="body" idx="1"/>
@@ -38634,7 +38634,7 @@
         <p:nvSpPr>
           <p:cNvPr id="14337" name="Rectangle 1"/>
           <p:cNvSpPr>
-            <a:spLocks noChangeArrowheads="1"/>
+            <a:spLocks noGrp="1" noChangeArrowheads="1"/>
           </p:cNvSpPr>
           <p:nvPr>
             <p:ph type="title"/>
@@ -38679,7 +38679,7 @@
         <p:nvSpPr>
           <p:cNvPr id="14338" name="Rectangle 2"/>
           <p:cNvSpPr>
-            <a:spLocks noChangeArrowheads="1"/>
+            <a:spLocks noGrp="1" noChangeArrowheads="1"/>
           </p:cNvSpPr>
           <p:nvPr>
             <p:ph type="body" idx="1"/>
@@ -40723,7 +40723,7 @@
         <p:nvSpPr>
           <p:cNvPr id="18433" name="Rectangle 1"/>
           <p:cNvSpPr>
-            <a:spLocks noChangeArrowheads="1"/>
+            <a:spLocks noGrp="1" noChangeArrowheads="1"/>
           </p:cNvSpPr>
           <p:nvPr>
             <p:ph type="title"/>
@@ -40768,7 +40768,7 @@
         <p:nvSpPr>
           <p:cNvPr id="18434" name="Rectangle 2"/>
           <p:cNvSpPr>
-            <a:spLocks noChangeArrowheads="1"/>
+            <a:spLocks noGrp="1" noChangeArrowheads="1"/>
           </p:cNvSpPr>
           <p:nvPr>
             <p:ph type="body" idx="1"/>
@@ -41360,7 +41360,7 @@
         <p:nvSpPr>
           <p:cNvPr id="19458" name="Rectangle 2"/>
           <p:cNvSpPr>
-            <a:spLocks noChangeArrowheads="1"/>
+            <a:spLocks noGrp="1" noChangeArrowheads="1"/>
           </p:cNvSpPr>
           <p:nvPr>
             <p:ph type="title"/>
@@ -41405,7 +41405,7 @@
         <p:nvSpPr>
           <p:cNvPr id="19459" name="Rectangle 3"/>
           <p:cNvSpPr>
-            <a:spLocks noChangeArrowheads="1"/>
+            <a:spLocks noGrp="1" noChangeArrowheads="1"/>
           </p:cNvSpPr>
           <p:nvPr>
             <p:ph type="body" idx="1"/>
@@ -41486,7 +41486,7 @@
         <p:nvSpPr>
           <p:cNvPr id="19460" name="Text Box 4"/>
           <p:cNvSpPr txBox="1">
-            <a:spLocks noChangeArrowheads="1"/>
+            <a:spLocks noGrp="1" noChangeArrowheads="1"/>
           </p:cNvSpPr>
           <p:nvPr>
             <p:ph type="sldNum" sz="quarter" idx="4"/>
@@ -42049,7 +42049,7 @@
         <p:nvSpPr>
           <p:cNvPr id="2049" name="Rectangle 1"/>
           <p:cNvSpPr>
-            <a:spLocks noChangeArrowheads="1"/>
+            <a:spLocks noGrp="1" noChangeArrowheads="1"/>
           </p:cNvSpPr>
           <p:nvPr>
             <p:ph type="title"/>
@@ -42094,7 +42094,7 @@
         <p:nvSpPr>
           <p:cNvPr id="2050" name="Rectangle 2"/>
           <p:cNvSpPr>
-            <a:spLocks noChangeArrowheads="1"/>
+            <a:spLocks noGrp="1" noChangeArrowheads="1"/>
           </p:cNvSpPr>
           <p:nvPr>
             <p:ph type="body" idx="1"/>
@@ -42175,7 +42175,7 @@
         <p:nvSpPr>
           <p:cNvPr id="2051" name="Text Box 3"/>
           <p:cNvSpPr txBox="1">
-            <a:spLocks noChangeArrowheads="1"/>
+            <a:spLocks noGrp="1" noChangeArrowheads="1"/>
           </p:cNvSpPr>
           <p:nvPr>
             <p:ph type="sldNum" sz="quarter" idx="4"/>
@@ -42770,7 +42770,7 @@
         <p:nvSpPr>
           <p:cNvPr id="20482" name="Rectangle 2"/>
           <p:cNvSpPr>
-            <a:spLocks noChangeArrowheads="1"/>
+            <a:spLocks noGrp="1" noChangeArrowheads="1"/>
           </p:cNvSpPr>
           <p:nvPr>
             <p:ph type="title"/>
@@ -42815,7 +42815,7 @@
         <p:nvSpPr>
           <p:cNvPr id="20483" name="Rectangle 3"/>
           <p:cNvSpPr>
-            <a:spLocks noChangeArrowheads="1"/>
+            <a:spLocks noGrp="1" noChangeArrowheads="1"/>
           </p:cNvSpPr>
           <p:nvPr>
             <p:ph type="body" idx="1"/>
@@ -42896,7 +42896,7 @@
         <p:nvSpPr>
           <p:cNvPr id="20484" name="Text Box 4"/>
           <p:cNvSpPr txBox="1">
-            <a:spLocks noChangeArrowheads="1"/>
+            <a:spLocks noGrp="1" noChangeArrowheads="1"/>
           </p:cNvSpPr>
           <p:nvPr>
             <p:ph type="sldNum" sz="quarter" idx="4"/>
@@ -43491,7 +43491,7 @@
         <p:nvSpPr>
           <p:cNvPr id="21506" name="Rectangle 2"/>
           <p:cNvSpPr>
-            <a:spLocks noChangeArrowheads="1"/>
+            <a:spLocks noGrp="1" noChangeArrowheads="1"/>
           </p:cNvSpPr>
           <p:nvPr>
             <p:ph type="title"/>
@@ -43536,7 +43536,7 @@
         <p:nvSpPr>
           <p:cNvPr id="21507" name="Rectangle 3"/>
           <p:cNvSpPr>
-            <a:spLocks noChangeArrowheads="1"/>
+            <a:spLocks noGrp="1" noChangeArrowheads="1"/>
           </p:cNvSpPr>
           <p:nvPr>
             <p:ph type="body" idx="1"/>
@@ -43617,7 +43617,7 @@
         <p:nvSpPr>
           <p:cNvPr id="21508" name="Text Box 4"/>
           <p:cNvSpPr txBox="1">
-            <a:spLocks noChangeArrowheads="1"/>
+            <a:spLocks noGrp="1" noChangeArrowheads="1"/>
           </p:cNvSpPr>
           <p:nvPr>
             <p:ph type="sldNum" sz="quarter" idx="4"/>
@@ -44180,7 +44180,7 @@
         <p:nvSpPr>
           <p:cNvPr id="3073" name="Rectangle 1"/>
           <p:cNvSpPr>
-            <a:spLocks noChangeArrowheads="1"/>
+            <a:spLocks noGrp="1" noChangeArrowheads="1"/>
           </p:cNvSpPr>
           <p:nvPr>
             <p:ph type="title"/>
@@ -44677,7 +44677,7 @@
         <p:nvSpPr>
           <p:cNvPr id="4097" name="Rectangle 1"/>
           <p:cNvSpPr>
-            <a:spLocks noChangeArrowheads="1"/>
+            <a:spLocks noGrp="1" noChangeArrowheads="1"/>
           </p:cNvSpPr>
           <p:nvPr>
             <p:ph type="body" idx="1"/>
@@ -45237,7 +45237,7 @@
         <p:nvSpPr>
           <p:cNvPr id="5121" name="Rectangle 1"/>
           <p:cNvSpPr>
-            <a:spLocks noChangeArrowheads="1"/>
+            <a:spLocks noGrp="1" noChangeArrowheads="1"/>
           </p:cNvSpPr>
           <p:nvPr>
             <p:ph type="title"/>
@@ -45734,7 +45734,7 @@
         <p:nvSpPr>
           <p:cNvPr id="6145" name="Rectangle 1"/>
           <p:cNvSpPr>
-            <a:spLocks noChangeArrowheads="1"/>
+            <a:spLocks noGrp="1" noChangeArrowheads="1"/>
           </p:cNvSpPr>
           <p:nvPr>
             <p:ph type="title"/>
@@ -46231,7 +46231,7 @@
         <p:nvSpPr>
           <p:cNvPr id="7169" name="Rectangle 1"/>
           <p:cNvSpPr>
-            <a:spLocks noChangeArrowheads="1"/>
+            <a:spLocks noGrp="1" noChangeArrowheads="1"/>
           </p:cNvSpPr>
           <p:nvPr>
             <p:ph type="body" idx="1"/>
@@ -46312,7 +46312,7 @@
         <p:nvSpPr>
           <p:cNvPr id="7170" name="Rectangle 2"/>
           <p:cNvSpPr>
-            <a:spLocks noChangeArrowheads="1"/>
+            <a:spLocks noGrp="1" noChangeArrowheads="1"/>
           </p:cNvSpPr>
           <p:nvPr>
             <p:ph type="title"/>
@@ -46809,7 +46809,7 @@
         <p:nvSpPr>
           <p:cNvPr id="8193" name="Rectangle 1"/>
           <p:cNvSpPr>
-            <a:spLocks noChangeArrowheads="1"/>
+            <a:spLocks noGrp="1" noChangeArrowheads="1"/>
           </p:cNvSpPr>
           <p:nvPr>
             <p:ph type="body" idx="1"/>
@@ -46890,7 +46890,7 @@
         <p:nvSpPr>
           <p:cNvPr id="8194" name="Rectangle 2"/>
           <p:cNvSpPr>
-            <a:spLocks noChangeArrowheads="1"/>
+            <a:spLocks noGrp="1" noChangeArrowheads="1"/>
           </p:cNvSpPr>
           <p:nvPr>
             <p:ph type="title"/>
@@ -47387,7 +47387,7 @@
         <p:nvSpPr>
           <p:cNvPr id="9217" name="Rectangle 1"/>
           <p:cNvSpPr>
-            <a:spLocks noChangeArrowheads="1"/>
+            <a:spLocks noGrp="1" noChangeArrowheads="1"/>
           </p:cNvSpPr>
           <p:nvPr>
             <p:ph type="title"/>
@@ -48113,7 +48113,7 @@
         <p:nvSpPr>
           <p:cNvPr id="23555" name="Rectangle 3"/>
           <p:cNvSpPr>
-            <a:spLocks noChangeArrowheads="1"/>
+            <a:spLocks noGrp="1" noChangeArrowheads="1"/>
           </p:cNvSpPr>
           <p:nvPr>
             <p:ph type="title"/>
@@ -48337,7 +48337,7 @@
         <p:nvSpPr>
           <p:cNvPr id="23555" name="Rectangle 3"/>
           <p:cNvSpPr>
-            <a:spLocks noChangeArrowheads="1"/>
+            <a:spLocks noGrp="1" noChangeArrowheads="1"/>
           </p:cNvSpPr>
           <p:nvPr>
             <p:ph type="title"/>
@@ -48585,7 +48585,7 @@
         <p:nvSpPr>
           <p:cNvPr id="23555" name="Rectangle 3"/>
           <p:cNvSpPr>
-            <a:spLocks noChangeArrowheads="1"/>
+            <a:spLocks noGrp="1" noChangeArrowheads="1"/>
           </p:cNvSpPr>
           <p:nvPr>
             <p:ph type="title"/>
@@ -48748,7 +48748,7 @@
         <p:nvSpPr>
           <p:cNvPr id="23555" name="Rectangle 3"/>
           <p:cNvSpPr>
-            <a:spLocks noChangeArrowheads="1"/>
+            <a:spLocks noGrp="1" noChangeArrowheads="1"/>
           </p:cNvSpPr>
           <p:nvPr>
             <p:ph type="title"/>
@@ -48911,7 +48911,7 @@
         <p:nvSpPr>
           <p:cNvPr id="23555" name="Rectangle 3"/>
           <p:cNvSpPr>
-            <a:spLocks noChangeArrowheads="1"/>
+            <a:spLocks noGrp="1" noChangeArrowheads="1"/>
           </p:cNvSpPr>
           <p:nvPr>
             <p:ph type="title"/>
@@ -49181,7 +49181,7 @@
         <p:nvSpPr>
           <p:cNvPr id="23555" name="Rectangle 3"/>
           <p:cNvSpPr>
-            <a:spLocks noChangeArrowheads="1"/>
+            <a:spLocks noGrp="1" noChangeArrowheads="1"/>
           </p:cNvSpPr>
           <p:nvPr>
             <p:ph type="title"/>
@@ -49563,7 +49563,7 @@
         <p:nvSpPr>
           <p:cNvPr id="23555" name="Rectangle 3"/>
           <p:cNvSpPr>
-            <a:spLocks noChangeArrowheads="1"/>
+            <a:spLocks noGrp="1" noChangeArrowheads="1"/>
           </p:cNvSpPr>
           <p:nvPr>
             <p:ph type="title"/>
@@ -49851,7 +49851,7 @@
         <p:nvSpPr>
           <p:cNvPr id="23555" name="Rectangle 3"/>
           <p:cNvSpPr>
-            <a:spLocks noChangeArrowheads="1"/>
+            <a:spLocks noGrp="1" noChangeArrowheads="1"/>
           </p:cNvSpPr>
           <p:nvPr>
             <p:ph type="title"/>
@@ -50168,7 +50168,7 @@
         <p:nvSpPr>
           <p:cNvPr id="23555" name="Rectangle 3"/>
           <p:cNvSpPr>
-            <a:spLocks noChangeArrowheads="1"/>
+            <a:spLocks noGrp="1" noChangeArrowheads="1"/>
           </p:cNvSpPr>
           <p:nvPr>
             <p:ph type="title"/>
@@ -50420,7 +50420,7 @@
         <p:nvSpPr>
           <p:cNvPr id="23555" name="Rectangle 3"/>
           <p:cNvSpPr>
-            <a:spLocks noChangeArrowheads="1"/>
+            <a:spLocks noGrp="1" noChangeArrowheads="1"/>
           </p:cNvSpPr>
           <p:nvPr>
             <p:ph type="title"/>
@@ -50650,7 +50650,7 @@
         <p:nvSpPr>
           <p:cNvPr id="23555" name="Rectangle 3"/>
           <p:cNvSpPr>
-            <a:spLocks noChangeArrowheads="1"/>
+            <a:spLocks noGrp="1" noChangeArrowheads="1"/>
           </p:cNvSpPr>
           <p:nvPr>
             <p:ph type="title"/>
@@ -50675,7 +50675,7 @@
         <p:nvSpPr>
           <p:cNvPr id="23556" name="Rectangle 4"/>
           <p:cNvSpPr>
-            <a:spLocks noChangeArrowheads="1"/>
+            <a:spLocks noGrp="1" noChangeArrowheads="1"/>
           </p:cNvSpPr>
           <p:nvPr>
             <p:ph type="body" idx="1"/>
@@ -51062,7 +51062,7 @@
         <p:nvSpPr>
           <p:cNvPr id="23555" name="Rectangle 3"/>
           <p:cNvSpPr>
-            <a:spLocks noChangeArrowheads="1"/>
+            <a:spLocks noGrp="1" noChangeArrowheads="1"/>
           </p:cNvSpPr>
           <p:nvPr>
             <p:ph type="title"/>
@@ -51134,7 +51134,7 @@
         </p:blipFill>
         <p:spPr>
           <a:xfrm>
-            <a:off x="6089335" y="1905000"/>
+            <a:off x="6089335" y="1981200"/>
             <a:ext cx="10166665" cy="6853238"/>
           </a:xfrm>
           <a:prstGeom prst="rect">
@@ -51260,7 +51260,7 @@
         <p:nvSpPr>
           <p:cNvPr id="23555" name="Rectangle 3"/>
           <p:cNvSpPr>
-            <a:spLocks noChangeArrowheads="1"/>
+            <a:spLocks noGrp="1" noChangeArrowheads="1"/>
           </p:cNvSpPr>
           <p:nvPr>
             <p:ph type="title"/>
@@ -51458,7 +51458,7 @@
         <p:nvSpPr>
           <p:cNvPr id="23555" name="Rectangle 3"/>
           <p:cNvSpPr>
-            <a:spLocks noChangeArrowheads="1"/>
+            <a:spLocks noGrp="1" noChangeArrowheads="1"/>
           </p:cNvSpPr>
           <p:nvPr>
             <p:ph type="title"/>
@@ -51648,7 +51648,7 @@
         <p:nvSpPr>
           <p:cNvPr id="23555" name="Rectangle 3"/>
           <p:cNvSpPr>
-            <a:spLocks noChangeArrowheads="1"/>
+            <a:spLocks noGrp="1" noChangeArrowheads="1"/>
           </p:cNvSpPr>
           <p:nvPr>
             <p:ph type="title"/>
@@ -51838,7 +51838,7 @@
         <p:nvSpPr>
           <p:cNvPr id="23555" name="Rectangle 3"/>
           <p:cNvSpPr>
-            <a:spLocks noChangeArrowheads="1"/>
+            <a:spLocks noGrp="1" noChangeArrowheads="1"/>
           </p:cNvSpPr>
           <p:nvPr>
             <p:ph type="title"/>
@@ -51981,7 +51981,7 @@
         <p:nvSpPr>
           <p:cNvPr id="23555" name="Rectangle 3"/>
           <p:cNvSpPr>
-            <a:spLocks noChangeArrowheads="1"/>
+            <a:spLocks noGrp="1" noChangeArrowheads="1"/>
           </p:cNvSpPr>
           <p:nvPr>
             <p:ph type="title"/>
@@ -52182,7 +52182,7 @@
         <p:nvSpPr>
           <p:cNvPr id="23555" name="Rectangle 3"/>
           <p:cNvSpPr>
-            <a:spLocks noChangeArrowheads="1"/>
+            <a:spLocks noGrp="1" noChangeArrowheads="1"/>
           </p:cNvSpPr>
           <p:nvPr>
             <p:ph type="title"/>
@@ -52387,7 +52387,7 @@
         <p:nvSpPr>
           <p:cNvPr id="23555" name="Rectangle 3"/>
           <p:cNvSpPr>
-            <a:spLocks noChangeArrowheads="1"/>
+            <a:spLocks noGrp="1" noChangeArrowheads="1"/>
           </p:cNvSpPr>
           <p:nvPr>
             <p:ph type="title"/>
@@ -52584,7 +52584,7 @@
         <p:nvSpPr>
           <p:cNvPr id="23555" name="Rectangle 3"/>
           <p:cNvSpPr>
-            <a:spLocks noChangeArrowheads="1"/>
+            <a:spLocks noGrp="1" noChangeArrowheads="1"/>
           </p:cNvSpPr>
           <p:nvPr>
             <p:ph type="title"/>
@@ -52782,7 +52782,7 @@
         <p:nvSpPr>
           <p:cNvPr id="23555" name="Rectangle 3"/>
           <p:cNvSpPr>
-            <a:spLocks noChangeArrowheads="1"/>
+            <a:spLocks noGrp="1" noChangeArrowheads="1"/>
           </p:cNvSpPr>
           <p:nvPr>
             <p:ph type="title"/>
@@ -52978,7 +52978,7 @@
         <p:nvSpPr>
           <p:cNvPr id="23555" name="Rectangle 3"/>
           <p:cNvSpPr>
-            <a:spLocks noChangeArrowheads="1"/>
+            <a:spLocks noGrp="1" noChangeArrowheads="1"/>
           </p:cNvSpPr>
           <p:nvPr>
             <p:ph type="title"/>

</xml_diff>